<commit_message>
fixing due date for lab4
</commit_message>
<xml_diff>
--- a/week11/CS1550_week_11_lab4_part1.pptx
+++ b/week11/CS1550_week_11_lab4_part1.pptx
@@ -232,7 +232,7 @@
           <a:p>
             <a:fld id="{E88F9708-BA00-DE40-895B-453A1C94E7F0}" type="datetimeFigureOut">
               <a:rPr lang="en-US" smtClean="0"/>
-              <a:t>3/25/19</a:t>
+              <a:t>3/26/19</a:t>
             </a:fld>
             <a:endParaRPr lang="en-US"/>
           </a:p>
@@ -2188,7 +2188,7 @@
           <a:p>
             <a:fld id="{A6DB1683-02BD-F244-8506-7D562026779F}" type="datetimeFigureOut">
               <a:rPr lang="en-US" smtClean="0"/>
-              <a:t>3/25/19</a:t>
+              <a:t>3/26/19</a:t>
             </a:fld>
             <a:endParaRPr lang="en-US"/>
           </a:p>
@@ -2386,7 +2386,7 @@
           <a:p>
             <a:fld id="{A6DB1683-02BD-F244-8506-7D562026779F}" type="datetimeFigureOut">
               <a:rPr lang="en-US" smtClean="0"/>
-              <a:t>3/25/19</a:t>
+              <a:t>3/26/19</a:t>
             </a:fld>
             <a:endParaRPr lang="en-US"/>
           </a:p>
@@ -2594,7 +2594,7 @@
           <a:p>
             <a:fld id="{A6DB1683-02BD-F244-8506-7D562026779F}" type="datetimeFigureOut">
               <a:rPr lang="en-US" smtClean="0"/>
-              <a:t>3/25/19</a:t>
+              <a:t>3/26/19</a:t>
             </a:fld>
             <a:endParaRPr lang="en-US"/>
           </a:p>
@@ -2792,7 +2792,7 @@
           <a:p>
             <a:fld id="{A6DB1683-02BD-F244-8506-7D562026779F}" type="datetimeFigureOut">
               <a:rPr lang="en-US" smtClean="0"/>
-              <a:t>3/25/19</a:t>
+              <a:t>3/26/19</a:t>
             </a:fld>
             <a:endParaRPr lang="en-US"/>
           </a:p>
@@ -3067,7 +3067,7 @@
           <a:p>
             <a:fld id="{A6DB1683-02BD-F244-8506-7D562026779F}" type="datetimeFigureOut">
               <a:rPr lang="en-US" smtClean="0"/>
-              <a:t>3/25/19</a:t>
+              <a:t>3/26/19</a:t>
             </a:fld>
             <a:endParaRPr lang="en-US"/>
           </a:p>
@@ -3332,7 +3332,7 @@
           <a:p>
             <a:fld id="{A6DB1683-02BD-F244-8506-7D562026779F}" type="datetimeFigureOut">
               <a:rPr lang="en-US" smtClean="0"/>
-              <a:t>3/25/19</a:t>
+              <a:t>3/26/19</a:t>
             </a:fld>
             <a:endParaRPr lang="en-US"/>
           </a:p>
@@ -3744,7 +3744,7 @@
           <a:p>
             <a:fld id="{A6DB1683-02BD-F244-8506-7D562026779F}" type="datetimeFigureOut">
               <a:rPr lang="en-US" smtClean="0"/>
-              <a:t>3/25/19</a:t>
+              <a:t>3/26/19</a:t>
             </a:fld>
             <a:endParaRPr lang="en-US"/>
           </a:p>
@@ -3885,7 +3885,7 @@
           <a:p>
             <a:fld id="{A6DB1683-02BD-F244-8506-7D562026779F}" type="datetimeFigureOut">
               <a:rPr lang="en-US" smtClean="0"/>
-              <a:t>3/25/19</a:t>
+              <a:t>3/26/19</a:t>
             </a:fld>
             <a:endParaRPr lang="en-US"/>
           </a:p>
@@ -3998,7 +3998,7 @@
           <a:p>
             <a:fld id="{A6DB1683-02BD-F244-8506-7D562026779F}" type="datetimeFigureOut">
               <a:rPr lang="en-US" smtClean="0"/>
-              <a:t>3/25/19</a:t>
+              <a:t>3/26/19</a:t>
             </a:fld>
             <a:endParaRPr lang="en-US"/>
           </a:p>
@@ -4309,7 +4309,7 @@
           <a:p>
             <a:fld id="{A6DB1683-02BD-F244-8506-7D562026779F}" type="datetimeFigureOut">
               <a:rPr lang="en-US" smtClean="0"/>
-              <a:t>3/25/19</a:t>
+              <a:t>3/26/19</a:t>
             </a:fld>
             <a:endParaRPr lang="en-US"/>
           </a:p>
@@ -4597,7 +4597,7 @@
           <a:p>
             <a:fld id="{A6DB1683-02BD-F244-8506-7D562026779F}" type="datetimeFigureOut">
               <a:rPr lang="en-US" smtClean="0"/>
-              <a:t>3/25/19</a:t>
+              <a:t>3/26/19</a:t>
             </a:fld>
             <a:endParaRPr lang="en-US"/>
           </a:p>
@@ -4838,7 +4838,7 @@
           <a:p>
             <a:fld id="{A6DB1683-02BD-F244-8506-7D562026779F}" type="datetimeFigureOut">
               <a:rPr lang="en-US" smtClean="0"/>
-              <a:t>3/25/19</a:t>
+              <a:t>3/26/19</a:t>
             </a:fld>
             <a:endParaRPr lang="en-US"/>
           </a:p>
@@ -17987,7 +17987,7 @@
             </a:r>
             <a:r>
               <a:rPr lang="en-US" dirty="0"/>
-              <a:t> March, 2019 @11:59pm</a:t>
+              <a:t> April, 2019 @11:59pm</a:t>
             </a:r>
           </a:p>
         </p:txBody>

</xml_diff>